<commit_message>
Updating the week's slides
</commit_message>
<xml_diff>
--- a/slides/11-07-thermodynamic_processes.pptx
+++ b/slides/11-07-thermodynamic_processes.pptx
@@ -36,6 +36,7 @@
     <p:sldId id="281" r:id="rId33"/>
     <p:sldId id="282" r:id="rId34"/>
     <p:sldId id="283" r:id="rId35"/>
+    <p:sldId id="284" r:id="rId36"/>
   </p:sldIdLst>
   <p:sldSz cx="24384000" cy="13716000"/>
   <p:notesSz cx="6858000" cy="9144000"/>
@@ -7950,14 +7951,14 @@
       </p:par>
     </p:tnLst>
     <p:bldLst>
-      <p:bldP build="whole" bldLvl="1" animBg="1" rev="0" advAuto="0" spid="279" grpId="6"/>
-      <p:bldP build="whole" bldLvl="1" animBg="1" rev="0" advAuto="0" spid="249" grpId="1"/>
       <p:bldP build="whole" bldLvl="1" animBg="1" rev="0" advAuto="0" spid="267" grpId="4"/>
-      <p:bldP build="whole" bldLvl="1" animBg="1" rev="0" advAuto="0" spid="289" grpId="8"/>
       <p:bldP build="whole" bldLvl="1" animBg="1" rev="0" advAuto="0" spid="256" grpId="2"/>
       <p:bldP build="whole" bldLvl="1" animBg="1" rev="0" advAuto="0" spid="272" grpId="5"/>
+      <p:bldP build="whole" bldLvl="1" animBg="1" rev="0" advAuto="0" spid="282" grpId="7"/>
       <p:bldP build="whole" bldLvl="1" animBg="1" rev="0" advAuto="0" spid="260" grpId="3"/>
-      <p:bldP build="whole" bldLvl="1" animBg="1" rev="0" advAuto="0" spid="282" grpId="7"/>
+      <p:bldP build="whole" bldLvl="1" animBg="1" rev="0" advAuto="0" spid="249" grpId="1"/>
+      <p:bldP build="whole" bldLvl="1" animBg="1" rev="0" advAuto="0" spid="279" grpId="6"/>
+      <p:bldP build="whole" bldLvl="1" animBg="1" rev="0" advAuto="0" spid="289" grpId="8"/>
     </p:bldLst>
   </p:timing>
 </p:sld>
@@ -10931,7 +10932,331 @@
       </p:grpSpPr>
       <p:sp>
         <p:nvSpPr>
-          <p:cNvPr id="325" name="How are free energy calculations useful?"/>
+          <p:cNvPr id="325" name="What is the free energy of a reaction?"/>
+          <p:cNvSpPr txBox="1"/>
+          <p:nvPr>
+            <p:ph type="title"/>
+          </p:nvPr>
+        </p:nvSpPr>
+        <p:spPr>
+          <a:prstGeom prst="rect">
+            <a:avLst/>
+          </a:prstGeom>
+        </p:spPr>
+        <p:txBody>
+          <a:bodyPr/>
+          <a:lstStyle>
+            <a:lvl1pPr defTabSz="739378">
+              <a:defRPr sz="10080"/>
+            </a:lvl1pPr>
+          </a:lstStyle>
+          <a:p>
+            <a:pPr/>
+            <a:r>
+              <a:t>What is the free energy of a reaction?</a:t>
+            </a:r>
+          </a:p>
+        </p:txBody>
+      </p:sp>
+      <p:sp>
+        <p:nvSpPr>
+          <p:cNvPr id="326" name="Slide Number"/>
+          <p:cNvSpPr txBox="1"/>
+          <p:nvPr>
+            <p:ph type="sldNum" sz="quarter" idx="2"/>
+          </p:nvPr>
+        </p:nvSpPr>
+        <p:spPr>
+          <a:prstGeom prst="rect">
+            <a:avLst/>
+          </a:prstGeom>
+          <a:extLst>
+            <a:ext uri="{C572A759-6A51-4108-AA02-DFA0A04FC94B}">
+              <ma14:wrappingTextBoxFlag xmlns:ma14="http://schemas.microsoft.com/office/mac/drawingml/2011/main" val="1"/>
+            </a:ext>
+          </a:extLst>
+        </p:spPr>
+        <p:txBody>
+          <a:bodyPr/>
+          <a:lstStyle/>
+          <a:p>
+            <a:pPr/>
+            <a:fld id="{86CB4B4D-7CA3-9044-876B-883B54F8677D}" type="slidenum"/>
+          </a:p>
+        </p:txBody>
+      </p:sp>
+      <p:pic>
+        <p:nvPicPr>
+          <p:cNvPr id="327" name="Picture 2" descr="Picture 2"/>
+          <p:cNvPicPr>
+            <a:picLocks noChangeAspect="1"/>
+          </p:cNvPicPr>
+          <p:nvPr/>
+        </p:nvPicPr>
+        <p:blipFill>
+          <a:blip r:embed="rId2">
+            <a:extLst/>
+          </a:blip>
+          <a:stretch>
+            <a:fillRect/>
+          </a:stretch>
+        </p:blipFill>
+        <p:spPr>
+          <a:xfrm>
+            <a:off x="3236765" y="3553432"/>
+            <a:ext cx="17892611" cy="8255001"/>
+          </a:xfrm>
+          <a:prstGeom prst="rect">
+            <a:avLst/>
+          </a:prstGeom>
+          <a:ln w="12700">
+            <a:miter lim="400000"/>
+          </a:ln>
+        </p:spPr>
+      </p:pic>
+      <p:sp>
+        <p:nvSpPr>
+          <p:cNvPr id="328" name="https://chem.libretexts.org/Bookshelves/Analytical_Chemistry/Supplemental_Modules_(Analytical_Chemistry)/Electrochemistry/Electrochemistry_and_Thermodynamics"/>
+          <p:cNvSpPr txBox="1"/>
+          <p:nvPr/>
+        </p:nvSpPr>
+        <p:spPr>
+          <a:xfrm>
+            <a:off x="627113" y="11743938"/>
+            <a:ext cx="23129775" cy="1108076"/>
+          </a:xfrm>
+          <a:prstGeom prst="rect">
+            <a:avLst/>
+          </a:prstGeom>
+          <a:ln w="12700">
+            <a:miter lim="400000"/>
+          </a:ln>
+          <a:extLst>
+            <a:ext uri="{C572A759-6A51-4108-AA02-DFA0A04FC94B}">
+              <ma14:wrappingTextBoxFlag xmlns:ma14="http://schemas.microsoft.com/office/mac/drawingml/2011/main" val="1"/>
+            </a:ext>
+          </a:extLst>
+        </p:spPr>
+        <p:txBody>
+          <a:bodyPr wrap="none" lIns="71437" tIns="71437" rIns="71437" bIns="71437" anchor="ctr">
+            <a:spAutoFit/>
+          </a:bodyPr>
+          <a:lstStyle/>
+          <a:p>
+            <a:pPr/>
+            <a:r>
+              <a:t>https://chem.libretexts.org/Bookshelves/Analytical_Chemistry/Supplemental_Modules_(Analytical_Chemistry)/Electrochemistry/Electrochemistry_and_Thermodynamics</a:t>
+            </a:r>
+          </a:p>
+        </p:txBody>
+      </p:sp>
+      <p:sp>
+        <p:nvSpPr>
+          <p:cNvPr id="329" name="Equation"/>
+          <p:cNvSpPr txBox="1"/>
+          <p:nvPr/>
+        </p:nvSpPr>
+        <p:spPr>
+          <a:xfrm>
+            <a:off x="8587181" y="3176872"/>
+            <a:ext cx="7191778" cy="445136"/>
+          </a:xfrm>
+          <a:prstGeom prst="rect">
+            <a:avLst/>
+          </a:prstGeom>
+          <a:ln w="12700">
+            <a:miter lim="400000"/>
+          </a:ln>
+        </p:spPr>
+        <p:txBody>
+          <a:bodyPr wrap="none" lIns="0" tIns="0" rIns="0" bIns="0">
+            <a:spAutoFit/>
+          </a:bodyPr>
+          <a:lstStyle/>
+          <a:p>
+            <a:pPr algn="l" defTabSz="914400" latinLnBrk="1">
+              <a:defRPr sz="1800"/>
+            </a:pPr>
+            <a14:m>
+              <m:oMathPara>
+                <m:oMathParaPr>
+                  <m:jc m:val="centerGroup"/>
+                </m:oMathParaPr>
+                <m:oMath>
+                  <m:r>
+                    <m:rPr>
+                      <m:sty m:val="p"/>
+                    </m:rPr>
+                    <a:rPr xmlns:a="http://schemas.openxmlformats.org/drawingml/2006/main" sz="5000" i="1">
+                      <a:solidFill>
+                        <a:srgbClr val="000000"/>
+                      </a:solidFill>
+                      <a:latin typeface="Cambria Math" panose="02040503050406030204" pitchFamily="18" charset="0"/>
+                    </a:rPr>
+                    <m:t>Δ</m:t>
+                  </m:r>
+                  <m:r>
+                    <a:rPr xmlns:a="http://schemas.openxmlformats.org/drawingml/2006/main" sz="5000" i="1">
+                      <a:solidFill>
+                        <a:srgbClr val="000000"/>
+                      </a:solidFill>
+                      <a:latin typeface="Cambria Math" panose="02040503050406030204" pitchFamily="18" charset="0"/>
+                    </a:rPr>
+                    <m:t>G</m:t>
+                  </m:r>
+                  <m:r>
+                    <a:rPr xmlns:a="http://schemas.openxmlformats.org/drawingml/2006/main" sz="5000" i="1">
+                      <a:solidFill>
+                        <a:srgbClr val="000000"/>
+                      </a:solidFill>
+                      <a:latin typeface="Cambria Math" panose="02040503050406030204" pitchFamily="18" charset="0"/>
+                    </a:rPr>
+                    <m:t>=</m:t>
+                  </m:r>
+                  <m:r>
+                    <m:rPr>
+                      <m:sty m:val="p"/>
+                    </m:rPr>
+                    <a:rPr xmlns:a="http://schemas.openxmlformats.org/drawingml/2006/main" sz="5000" i="1">
+                      <a:solidFill>
+                        <a:srgbClr val="000000"/>
+                      </a:solidFill>
+                      <a:latin typeface="Cambria Math" panose="02040503050406030204" pitchFamily="18" charset="0"/>
+                    </a:rPr>
+                    <m:t>Δ</m:t>
+                  </m:r>
+                  <m:r>
+                    <a:rPr xmlns:a="http://schemas.openxmlformats.org/drawingml/2006/main" sz="5000" i="1">
+                      <a:solidFill>
+                        <a:srgbClr val="000000"/>
+                      </a:solidFill>
+                      <a:latin typeface="Cambria Math" panose="02040503050406030204" pitchFamily="18" charset="0"/>
+                    </a:rPr>
+                    <m:t>H</m:t>
+                  </m:r>
+                  <m:r>
+                    <a:rPr xmlns:a="http://schemas.openxmlformats.org/drawingml/2006/main" sz="5000" i="1">
+                      <a:solidFill>
+                        <a:srgbClr val="000000"/>
+                      </a:solidFill>
+                      <a:latin typeface="Cambria Math" panose="02040503050406030204" pitchFamily="18" charset="0"/>
+                    </a:rPr>
+                    <m:t>-</m:t>
+                  </m:r>
+                  <m:r>
+                    <a:rPr xmlns:a="http://schemas.openxmlformats.org/drawingml/2006/main" sz="5000" i="1">
+                      <a:solidFill>
+                        <a:srgbClr val="000000"/>
+                      </a:solidFill>
+                      <a:latin typeface="Cambria Math" panose="02040503050406030204" pitchFamily="18" charset="0"/>
+                    </a:rPr>
+                    <m:t>T</m:t>
+                  </m:r>
+                  <m:r>
+                    <m:rPr>
+                      <m:sty m:val="p"/>
+                    </m:rPr>
+                    <a:rPr xmlns:a="http://schemas.openxmlformats.org/drawingml/2006/main" sz="5000" i="1">
+                      <a:solidFill>
+                        <a:srgbClr val="000000"/>
+                      </a:solidFill>
+                      <a:latin typeface="Cambria Math" panose="02040503050406030204" pitchFamily="18" charset="0"/>
+                    </a:rPr>
+                    <m:t>Δ</m:t>
+                  </m:r>
+                  <m:r>
+                    <a:rPr xmlns:a="http://schemas.openxmlformats.org/drawingml/2006/main" sz="5000" i="1">
+                      <a:solidFill>
+                        <a:srgbClr val="000000"/>
+                      </a:solidFill>
+                      <a:latin typeface="Cambria Math" panose="02040503050406030204" pitchFamily="18" charset="0"/>
+                    </a:rPr>
+                    <m:t>S</m:t>
+                  </m:r>
+                  <m:r>
+                    <a:rPr xmlns:a="http://schemas.openxmlformats.org/drawingml/2006/main" sz="5000" i="1">
+                      <a:solidFill>
+                        <a:srgbClr val="000000"/>
+                      </a:solidFill>
+                      <a:latin typeface="Cambria Math" panose="02040503050406030204" pitchFamily="18" charset="0"/>
+                    </a:rPr>
+                    <m:t>=</m:t>
+                  </m:r>
+                  <m:r>
+                    <a:rPr xmlns:a="http://schemas.openxmlformats.org/drawingml/2006/main" sz="5000" i="1">
+                      <a:solidFill>
+                        <a:srgbClr val="000000"/>
+                      </a:solidFill>
+                      <a:latin typeface="Cambria Math" panose="02040503050406030204" pitchFamily="18" charset="0"/>
+                    </a:rPr>
+                    <m:t>R</m:t>
+                  </m:r>
+                  <m:r>
+                    <a:rPr xmlns:a="http://schemas.openxmlformats.org/drawingml/2006/main" sz="5000" i="1">
+                      <a:solidFill>
+                        <a:srgbClr val="000000"/>
+                      </a:solidFill>
+                      <a:latin typeface="Cambria Math" panose="02040503050406030204" pitchFamily="18" charset="0"/>
+                    </a:rPr>
+                    <m:t>T</m:t>
+                  </m:r>
+                  <m:r>
+                    <m:rPr>
+                      <m:sty m:val="p"/>
+                    </m:rPr>
+                    <a:rPr xmlns:a="http://schemas.openxmlformats.org/drawingml/2006/main" sz="5000" i="1">
+                      <a:solidFill>
+                        <a:srgbClr val="000000"/>
+                      </a:solidFill>
+                      <a:latin typeface="Cambria Math" panose="02040503050406030204" pitchFamily="18" charset="0"/>
+                    </a:rPr>
+                    <m:t>ln</m:t>
+                  </m:r>
+                  <m:r>
+                    <a:rPr xmlns:a="http://schemas.openxmlformats.org/drawingml/2006/main" sz="5000" i="1">
+                      <a:solidFill>
+                        <a:srgbClr val="000000"/>
+                      </a:solidFill>
+                      <a:latin typeface="Cambria Math" panose="02040503050406030204" pitchFamily="18" charset="0"/>
+                    </a:rPr>
+                    <m:t>K</m:t>
+                  </m:r>
+                </m:oMath>
+              </m:oMathPara>
+            </a14:m>
+            <a:endParaRPr sz="5000"/>
+          </a:p>
+        </p:txBody>
+      </p:sp>
+    </p:spTree>
+  </p:cSld>
+  <p:clrMapOvr>
+    <a:masterClrMapping/>
+  </p:clrMapOvr>
+  <p:transition xmlns:p14="http://schemas.microsoft.com/office/powerpoint/2010/main" spd="med" advClick="1"/>
+</p:sld>
+</file>
+
+<file path=ppt/slides/slide22.xml><?xml version="1.0" encoding="utf-8"?>
+<p:sld xmlns:a="http://schemas.openxmlformats.org/drawingml/2006/main" xmlns:r="http://schemas.openxmlformats.org/officeDocument/2006/relationships" xmlns:p="http://schemas.openxmlformats.org/presentationml/2006/main" xmlns:m="http://schemas.openxmlformats.org/officeDocument/2006/math" xmlns:a14="http://schemas.microsoft.com/office/drawing/2010/main" showMasterSp="1" showMasterPhAnim="1">
+  <p:cSld>
+    <p:spTree>
+      <p:nvGrpSpPr>
+        <p:cNvPr id="1" name=""/>
+        <p:cNvGrpSpPr/>
+        <p:nvPr/>
+      </p:nvGrpSpPr>
+      <p:grpSpPr>
+        <a:xfrm>
+          <a:off x="0" y="0"/>
+          <a:ext cx="0" cy="0"/>
+          <a:chOff x="0" y="0"/>
+          <a:chExt cx="0" cy="0"/>
+        </a:xfrm>
+      </p:grpSpPr>
+      <p:sp>
+        <p:nvSpPr>
+          <p:cNvPr id="331" name="How are free energy calculations useful?"/>
           <p:cNvSpPr txBox="1"/>
           <p:nvPr>
             <p:ph type="title"/>
@@ -10959,7 +11284,7 @@
       </p:sp>
       <p:sp>
         <p:nvSpPr>
-          <p:cNvPr id="326" name="Noncovalent binding between molecules (see [2])…"/>
+          <p:cNvPr id="332" name="Noncovalent binding between molecules (see [2])…"/>
           <p:cNvSpPr txBox="1"/>
           <p:nvPr>
             <p:ph type="body" idx="1"/>
@@ -11043,7 +11368,7 @@
       </p:sp>
       <p:grpSp>
         <p:nvGrpSpPr>
-          <p:cNvPr id="333" name="Group"/>
+          <p:cNvPr id="339" name="Group"/>
           <p:cNvGrpSpPr/>
           <p:nvPr/>
         </p:nvGrpSpPr>
@@ -11057,7 +11382,7 @@
         </p:grpSpPr>
         <p:grpSp>
           <p:nvGrpSpPr>
-            <p:cNvPr id="331" name="Group"/>
+            <p:cNvPr id="337" name="Group"/>
             <p:cNvGrpSpPr/>
             <p:nvPr/>
           </p:nvGrpSpPr>
@@ -11071,7 +11396,7 @@
           </p:grpSpPr>
           <p:grpSp>
             <p:nvGrpSpPr>
-              <p:cNvPr id="329" name="image26.png"/>
+              <p:cNvPr id="335" name="image26.png"/>
               <p:cNvGrpSpPr/>
               <p:nvPr/>
             </p:nvGrpSpPr>
@@ -11085,7 +11410,7 @@
             </p:grpSpPr>
             <p:pic>
               <p:nvPicPr>
-                <p:cNvPr id="328" name="image26.png" descr="image26.png"/>
+                <p:cNvPr id="334" name="image26.png" descr="image26.png"/>
                 <p:cNvPicPr>
                   <a:picLocks noChangeAspect="1"/>
                 </p:cNvPicPr>
@@ -11196,7 +11521,7 @@
             </p:pic>
             <p:pic>
               <p:nvPicPr>
-                <p:cNvPr id="327" name="image26.png" descr="image26.png"/>
+                <p:cNvPr id="333" name="image26.png" descr="image26.png"/>
                 <p:cNvPicPr>
                   <a:picLocks noChangeAspect="0"/>
                 </p:cNvPicPr>
@@ -11224,7 +11549,7 @@
           </p:grpSp>
           <p:pic>
             <p:nvPicPr>
-              <p:cNvPr id="330" name="image27.png" descr="image27.png"/>
+              <p:cNvPr id="336" name="image27.png" descr="image27.png"/>
               <p:cNvPicPr>
                 <a:picLocks noChangeAspect="1"/>
               </p:cNvPicPr>
@@ -11256,7 +11581,7 @@
         </p:grpSp>
         <p:sp>
           <p:nvSpPr>
-            <p:cNvPr id="332" name="(from [1])"/>
+            <p:cNvPr id="338" name="(from [1])"/>
             <p:cNvSpPr txBox="1"/>
             <p:nvPr/>
           </p:nvSpPr>
@@ -11296,84 +11621,7 @@
       </p:grpSp>
       <p:sp>
         <p:nvSpPr>
-          <p:cNvPr id="334" name="Slide Number"/>
-          <p:cNvSpPr txBox="1"/>
-          <p:nvPr>
-            <p:ph type="sldNum" sz="quarter" idx="2"/>
-          </p:nvPr>
-        </p:nvSpPr>
-        <p:spPr>
-          <a:prstGeom prst="rect">
-            <a:avLst/>
-          </a:prstGeom>
-          <a:extLst>
-            <a:ext uri="{C572A759-6A51-4108-AA02-DFA0A04FC94B}">
-              <ma14:wrappingTextBoxFlag xmlns:ma14="http://schemas.microsoft.com/office/mac/drawingml/2011/main" val="1"/>
-            </a:ext>
-          </a:extLst>
-        </p:spPr>
-        <p:txBody>
-          <a:bodyPr/>
-          <a:lstStyle/>
-          <a:p>
-            <a:pPr/>
-            <a:fld id="{86CB4B4D-7CA3-9044-876B-883B54F8677D}" type="slidenum"/>
-          </a:p>
-        </p:txBody>
-      </p:sp>
-    </p:spTree>
-  </p:cSld>
-  <p:clrMapOvr>
-    <a:masterClrMapping/>
-  </p:clrMapOvr>
-  <p:transition xmlns:p14="http://schemas.microsoft.com/office/powerpoint/2010/main" spd="med" advClick="1"/>
-</p:sld>
-</file>
-
-<file path=ppt/slides/slide22.xml><?xml version="1.0" encoding="utf-8"?>
-<p:sld xmlns:a="http://schemas.openxmlformats.org/drawingml/2006/main" xmlns:r="http://schemas.openxmlformats.org/officeDocument/2006/relationships" xmlns:p="http://schemas.openxmlformats.org/presentationml/2006/main" xmlns:m="http://schemas.openxmlformats.org/officeDocument/2006/math" xmlns:a14="http://schemas.microsoft.com/office/drawing/2010/main" showMasterSp="1" showMasterPhAnim="1">
-  <p:cSld>
-    <p:spTree>
-      <p:nvGrpSpPr>
-        <p:cNvPr id="1" name=""/>
-        <p:cNvGrpSpPr/>
-        <p:nvPr/>
-      </p:nvGrpSpPr>
-      <p:grpSpPr>
-        <a:xfrm>
-          <a:off x="0" y="0"/>
-          <a:ext cx="0" cy="0"/>
-          <a:chOff x="0" y="0"/>
-          <a:chExt cx="0" cy="0"/>
-        </a:xfrm>
-      </p:grpSpPr>
-      <p:sp>
-        <p:nvSpPr>
-          <p:cNvPr id="336" name="How are ΔG/ΔA calculated from molecular simulations?"/>
-          <p:cNvSpPr txBox="1"/>
-          <p:nvPr>
-            <p:ph type="title"/>
-          </p:nvPr>
-        </p:nvSpPr>
-        <p:spPr>
-          <a:prstGeom prst="rect">
-            <a:avLst/>
-          </a:prstGeom>
-        </p:spPr>
-        <p:txBody>
-          <a:bodyPr/>
-          <a:lstStyle/>
-          <a:p>
-            <a:pPr/>
-            <a:r>
-              <a:t>How are ΔG/ΔA calculated from molecular simulations?</a:t>
-            </a:r>
-          </a:p>
-        </p:txBody>
-      </p:sp>
-      <p:sp>
-        <p:nvSpPr>
-          <p:cNvPr id="337" name="Slide Number"/>
+          <p:cNvPr id="340" name="Slide Number"/>
           <p:cNvSpPr txBox="1"/>
           <p:nvPr>
             <p:ph type="sldNum" sz="quarter" idx="2"/>
@@ -11426,7 +11674,7 @@
       </p:grpSpPr>
       <p:sp>
         <p:nvSpPr>
-          <p:cNvPr id="339" name="Basic Statistical Mechanics"/>
+          <p:cNvPr id="342" name="How are ΔG/ΔA calculated from molecular simulations?"/>
           <p:cNvSpPr txBox="1"/>
           <p:nvPr>
             <p:ph type="title"/>
@@ -11443,14 +11691,91 @@
           <a:p>
             <a:pPr/>
             <a:r>
-              <a:t>Basic Statistical Mechanics</a:t>
+              <a:t>How are ΔG/ΔA calculated from molecular simulations?</a:t>
             </a:r>
           </a:p>
         </p:txBody>
       </p:sp>
       <p:sp>
         <p:nvSpPr>
-          <p:cNvPr id="340" name="In the Boltzmann distribution, the probability of a configuration   with energy   is,…"/>
+          <p:cNvPr id="343" name="Slide Number"/>
+          <p:cNvSpPr txBox="1"/>
+          <p:nvPr>
+            <p:ph type="sldNum" sz="quarter" idx="2"/>
+          </p:nvPr>
+        </p:nvSpPr>
+        <p:spPr>
+          <a:prstGeom prst="rect">
+            <a:avLst/>
+          </a:prstGeom>
+          <a:extLst>
+            <a:ext uri="{C572A759-6A51-4108-AA02-DFA0A04FC94B}">
+              <ma14:wrappingTextBoxFlag xmlns:ma14="http://schemas.microsoft.com/office/mac/drawingml/2011/main" val="1"/>
+            </a:ext>
+          </a:extLst>
+        </p:spPr>
+        <p:txBody>
+          <a:bodyPr/>
+          <a:lstStyle/>
+          <a:p>
+            <a:pPr/>
+            <a:fld id="{86CB4B4D-7CA3-9044-876B-883B54F8677D}" type="slidenum"/>
+          </a:p>
+        </p:txBody>
+      </p:sp>
+    </p:spTree>
+  </p:cSld>
+  <p:clrMapOvr>
+    <a:masterClrMapping/>
+  </p:clrMapOvr>
+  <p:transition xmlns:p14="http://schemas.microsoft.com/office/powerpoint/2010/main" spd="med" advClick="1"/>
+</p:sld>
+</file>
+
+<file path=ppt/slides/slide24.xml><?xml version="1.0" encoding="utf-8"?>
+<p:sld xmlns:a="http://schemas.openxmlformats.org/drawingml/2006/main" xmlns:r="http://schemas.openxmlformats.org/officeDocument/2006/relationships" xmlns:p="http://schemas.openxmlformats.org/presentationml/2006/main" xmlns:m="http://schemas.openxmlformats.org/officeDocument/2006/math" xmlns:a14="http://schemas.microsoft.com/office/drawing/2010/main" showMasterSp="1" showMasterPhAnim="1">
+  <p:cSld>
+    <p:spTree>
+      <p:nvGrpSpPr>
+        <p:cNvPr id="1" name=""/>
+        <p:cNvGrpSpPr/>
+        <p:nvPr/>
+      </p:nvGrpSpPr>
+      <p:grpSpPr>
+        <a:xfrm>
+          <a:off x="0" y="0"/>
+          <a:ext cx="0" cy="0"/>
+          <a:chOff x="0" y="0"/>
+          <a:chExt cx="0" cy="0"/>
+        </a:xfrm>
+      </p:grpSpPr>
+      <p:sp>
+        <p:nvSpPr>
+          <p:cNvPr id="345" name="Basic Statistical Mechanics"/>
+          <p:cNvSpPr txBox="1"/>
+          <p:nvPr>
+            <p:ph type="title"/>
+          </p:nvPr>
+        </p:nvSpPr>
+        <p:spPr>
+          <a:prstGeom prst="rect">
+            <a:avLst/>
+          </a:prstGeom>
+        </p:spPr>
+        <p:txBody>
+          <a:bodyPr/>
+          <a:lstStyle/>
+          <a:p>
+            <a:pPr/>
+            <a:r>
+              <a:t>Basic Statistical Mechanics</a:t>
+            </a:r>
+          </a:p>
+        </p:txBody>
+      </p:sp>
+      <p:sp>
+        <p:nvSpPr>
+          <p:cNvPr id="346" name="In the Boltzmann distribution, the probability of a configuration   with energy   is,…"/>
           <p:cNvSpPr txBox="1"/>
           <p:nvPr>
             <p:ph type="body" idx="1"/>
@@ -12411,7 +12736,7 @@
       </p:sp>
       <p:sp>
         <p:nvSpPr>
-          <p:cNvPr id="341" name="Slide Number"/>
+          <p:cNvPr id="347" name="Slide Number"/>
           <p:cNvSpPr txBox="1"/>
           <p:nvPr>
             <p:ph type="sldNum" sz="quarter" idx="2"/>
@@ -12445,7 +12770,7 @@
 </p:sld>
 </file>
 
-<file path=ppt/slides/slide24.xml><?xml version="1.0" encoding="utf-8"?>
+<file path=ppt/slides/slide25.xml><?xml version="1.0" encoding="utf-8"?>
 <p:sld xmlns:a="http://schemas.openxmlformats.org/drawingml/2006/main" xmlns:r="http://schemas.openxmlformats.org/officeDocument/2006/relationships" xmlns:p="http://schemas.openxmlformats.org/presentationml/2006/main" xmlns:m="http://schemas.openxmlformats.org/officeDocument/2006/math" xmlns:a14="http://schemas.microsoft.com/office/drawing/2010/main" showMasterSp="1" showMasterPhAnim="1">
   <p:cSld>
     <p:spTree>
@@ -12464,7 +12789,7 @@
       </p:grpSpPr>
       <p:sp>
         <p:nvSpPr>
-          <p:cNvPr id="343" name="The Zwanzig Relation: Derivation"/>
+          <p:cNvPr id="349" name="The Zwanzig Relation: Derivation"/>
           <p:cNvSpPr txBox="1"/>
           <p:nvPr>
             <p:ph type="title"/>
@@ -12488,7 +12813,7 @@
       </p:sp>
       <p:sp>
         <p:nvSpPr>
-          <p:cNvPr id="344" name="From before,  .…"/>
+          <p:cNvPr id="350" name="From before,  .…"/>
           <p:cNvSpPr txBox="1"/>
           <p:nvPr>
             <p:ph type="body" idx="1"/>
@@ -14534,7 +14859,7 @@
       </p:sp>
       <p:sp>
         <p:nvSpPr>
-          <p:cNvPr id="345" name="Slide Number"/>
+          <p:cNvPr id="351" name="Slide Number"/>
           <p:cNvSpPr txBox="1"/>
           <p:nvPr>
             <p:ph type="sldNum" sz="quarter" idx="2"/>
@@ -14568,7 +14893,7 @@
 </p:sld>
 </file>
 
-<file path=ppt/slides/slide25.xml><?xml version="1.0" encoding="utf-8"?>
+<file path=ppt/slides/slide26.xml><?xml version="1.0" encoding="utf-8"?>
 <p:sld xmlns:a="http://schemas.openxmlformats.org/drawingml/2006/main" xmlns:r="http://schemas.openxmlformats.org/officeDocument/2006/relationships" xmlns:p="http://schemas.openxmlformats.org/presentationml/2006/main" xmlns:m="http://schemas.openxmlformats.org/officeDocument/2006/math" xmlns:a14="http://schemas.microsoft.com/office/drawing/2010/main" showMasterSp="1" showMasterPhAnim="1">
   <p:cSld>
     <p:spTree>
@@ -14587,7 +14912,7 @@
       </p:grpSpPr>
       <p:sp>
         <p:nvSpPr>
-          <p:cNvPr id="347" name="The Zwanzig Relation: In Practice"/>
+          <p:cNvPr id="353" name="The Zwanzig Relation: In Practice"/>
           <p:cNvSpPr txBox="1"/>
           <p:nvPr>
             <p:ph type="title"/>
@@ -14611,7 +14936,7 @@
       </p:sp>
       <p:sp>
         <p:nvSpPr>
-          <p:cNvPr id="348" name="Using the definition of  ,  .…"/>
+          <p:cNvPr id="354" name="Using the definition of  ,  .…"/>
           <p:cNvSpPr txBox="1"/>
           <p:nvPr>
             <p:ph type="body" idx="1"/>
@@ -15579,7 +15904,7 @@
       </p:sp>
       <p:sp>
         <p:nvSpPr>
-          <p:cNvPr id="349" name="Slide Number"/>
+          <p:cNvPr id="355" name="Slide Number"/>
           <p:cNvSpPr txBox="1"/>
           <p:nvPr>
             <p:ph type="sldNum" sz="quarter" idx="2"/>
@@ -15613,7 +15938,7 @@
 </p:sld>
 </file>
 
-<file path=ppt/slides/slide26.xml><?xml version="1.0" encoding="utf-8"?>
+<file path=ppt/slides/slide27.xml><?xml version="1.0" encoding="utf-8"?>
 <p:sld xmlns:a="http://schemas.openxmlformats.org/drawingml/2006/main" xmlns:r="http://schemas.openxmlformats.org/officeDocument/2006/relationships" xmlns:p="http://schemas.openxmlformats.org/presentationml/2006/main" xmlns:m="http://schemas.openxmlformats.org/officeDocument/2006/math" xmlns:a14="http://schemas.microsoft.com/office/drawing/2010/main" showMasterSp="1" showMasterPhAnim="1">
   <p:cSld>
     <p:spTree>
@@ -15632,7 +15957,7 @@
       </p:grpSpPr>
       <p:sp>
         <p:nvSpPr>
-          <p:cNvPr id="351" name="The Zwanzig Relation: Limitations"/>
+          <p:cNvPr id="357" name="The Zwanzig Relation: Limitations"/>
           <p:cNvSpPr txBox="1"/>
           <p:nvPr>
             <p:ph type="title"/>
@@ -15660,7 +15985,7 @@
       </p:sp>
       <p:sp>
         <p:nvSpPr>
-          <p:cNvPr id="352" name="In terms of an integral over the distribution of   (instead of over  ) the Zwanzig relation is, .…"/>
+          <p:cNvPr id="358" name="In terms of an integral over the distribution of   (instead of over  ) the Zwanzig relation is, .…"/>
           <p:cNvSpPr txBox="1"/>
           <p:nvPr>
             <p:ph type="body" idx="1"/>
@@ -16152,7 +16477,7 @@
       </p:sp>
       <p:sp>
         <p:nvSpPr>
-          <p:cNvPr id="353" name="Slide Number"/>
+          <p:cNvPr id="359" name="Slide Number"/>
           <p:cNvSpPr txBox="1"/>
           <p:nvPr>
             <p:ph type="sldNum" sz="quarter" idx="2"/>
@@ -16179,7 +16504,7 @@
       </p:sp>
       <p:grpSp>
         <p:nvGrpSpPr>
-          <p:cNvPr id="356" name="Group"/>
+          <p:cNvPr id="362" name="Group"/>
           <p:cNvGrpSpPr/>
           <p:nvPr/>
         </p:nvGrpSpPr>
@@ -16193,7 +16518,7 @@
         </p:grpSpPr>
         <p:pic>
           <p:nvPicPr>
-            <p:cNvPr id="354" name="droppedImage.pdf" descr="droppedImage.pdf"/>
+            <p:cNvPr id="360" name="droppedImage.pdf" descr="droppedImage.pdf"/>
             <p:cNvPicPr>
               <a:picLocks noChangeAspect="1"/>
             </p:cNvPicPr>
@@ -16224,7 +16549,7 @@
         </p:pic>
         <p:sp>
           <p:nvSpPr>
-            <p:cNvPr id="355" name="(from [1])"/>
+            <p:cNvPr id="361" name="(from [1])"/>
             <p:cNvSpPr txBox="1"/>
             <p:nvPr/>
           </p:nvSpPr>
@@ -16271,153 +16596,6 @@
 </p:sld>
 </file>
 
-<file path=ppt/slides/slide27.xml><?xml version="1.0" encoding="utf-8"?>
-<p:sld xmlns:a="http://schemas.openxmlformats.org/drawingml/2006/main" xmlns:r="http://schemas.openxmlformats.org/officeDocument/2006/relationships" xmlns:p="http://schemas.openxmlformats.org/presentationml/2006/main" xmlns:m="http://schemas.openxmlformats.org/officeDocument/2006/math" xmlns:a14="http://schemas.microsoft.com/office/drawing/2010/main" showMasterSp="1" showMasterPhAnim="1">
-  <p:cSld>
-    <p:spTree>
-      <p:nvGrpSpPr>
-        <p:cNvPr id="1" name=""/>
-        <p:cNvGrpSpPr/>
-        <p:nvPr/>
-      </p:nvGrpSpPr>
-      <p:grpSpPr>
-        <a:xfrm>
-          <a:off x="0" y="0"/>
-          <a:ext cx="0" cy="0"/>
-          <a:chOff x="0" y="0"/>
-          <a:chExt cx="0" cy="0"/>
-        </a:xfrm>
-      </p:grpSpPr>
-      <p:sp>
-        <p:nvSpPr>
-          <p:cNvPr id="358" name="Other ways to calculate ΔG"/>
-          <p:cNvSpPr txBox="1"/>
-          <p:nvPr>
-            <p:ph type="title"/>
-          </p:nvPr>
-        </p:nvSpPr>
-        <p:spPr>
-          <a:prstGeom prst="rect">
-            <a:avLst/>
-          </a:prstGeom>
-        </p:spPr>
-        <p:txBody>
-          <a:bodyPr/>
-          <a:lstStyle/>
-          <a:p>
-            <a:pPr/>
-            <a:r>
-              <a:t>Other ways to calculate ΔG</a:t>
-            </a:r>
-          </a:p>
-        </p:txBody>
-      </p:sp>
-      <p:sp>
-        <p:nvSpPr>
-          <p:cNvPr id="359" name="Multistate Bennett Acceptance Ratio (MBAR) [5]…"/>
-          <p:cNvSpPr txBox="1"/>
-          <p:nvPr>
-            <p:ph type="body" idx="1"/>
-          </p:nvPr>
-        </p:nvSpPr>
-        <p:spPr>
-          <a:prstGeom prst="rect">
-            <a:avLst/>
-          </a:prstGeom>
-        </p:spPr>
-        <p:txBody>
-          <a:bodyPr/>
-          <a:lstStyle/>
-          <a:p>
-            <a:pPr/>
-            <a:r>
-              <a:t>Multistate Bennett Acceptance Ratio (MBAR) [5]</a:t>
-            </a:r>
-          </a:p>
-          <a:p>
-            <a:pPr lvl="1"/>
-            <a:r>
-              <a:t>estimates free energies and thermodynamic expectations from a series of states</a:t>
-            </a:r>
-          </a:p>
-          <a:p>
-            <a:pPr lvl="1"/>
-            <a:r>
-              <a:t>extension of Bennett Acceptance Ratio (BAR) [4], which uses data from two states</a:t>
-            </a:r>
-          </a:p>
-          <a:p>
-            <a:pPr lvl="1"/>
-            <a:r>
-              <a:t>Proven to be statistically optimal</a:t>
-            </a:r>
-          </a:p>
-          <a:p>
-            <a:pPr/>
-            <a:r>
-              <a:t>Thermodynamic integration is based on the fundamental theorem of calculus, integrating one the derivative of the free energy with respect to a parameter</a:t>
-            </a:r>
-          </a:p>
-          <a:p>
-            <a:pPr/>
-            <a:r>
-              <a:rPr u="sng"/>
-              <a:t>All</a:t>
-            </a:r>
-            <a:r>
-              <a:t> of the methods require thermodynamic states with configuration space overlap, meaning that</a:t>
-            </a:r>
-          </a:p>
-          <a:p>
-            <a:pPr lvl="1"/>
-            <a:r>
-              <a:t>similar configurations have similar energies</a:t>
-            </a:r>
-          </a:p>
-          <a:p>
-            <a:pPr lvl="1"/>
-            <a:r>
-              <a:t>the most relevant configuration space is similar</a:t>
-            </a:r>
-          </a:p>
-        </p:txBody>
-      </p:sp>
-      <p:sp>
-        <p:nvSpPr>
-          <p:cNvPr id="360" name="Slide Number"/>
-          <p:cNvSpPr txBox="1"/>
-          <p:nvPr>
-            <p:ph type="sldNum" sz="quarter" idx="2"/>
-          </p:nvPr>
-        </p:nvSpPr>
-        <p:spPr>
-          <a:prstGeom prst="rect">
-            <a:avLst/>
-          </a:prstGeom>
-          <a:extLst>
-            <a:ext uri="{C572A759-6A51-4108-AA02-DFA0A04FC94B}">
-              <ma14:wrappingTextBoxFlag xmlns:ma14="http://schemas.microsoft.com/office/mac/drawingml/2011/main" val="1"/>
-            </a:ext>
-          </a:extLst>
-        </p:spPr>
-        <p:txBody>
-          <a:bodyPr/>
-          <a:lstStyle/>
-          <a:p>
-            <a:pPr/>
-            <a:fld id="{86CB4B4D-7CA3-9044-876B-883B54F8677D}" type="slidenum"/>
-          </a:p>
-        </p:txBody>
-      </p:sp>
-    </p:spTree>
-  </p:cSld>
-  <p:clrMapOvr>
-    <a:masterClrMapping/>
-  </p:clrMapOvr>
-  <p:transition xmlns:p14="http://schemas.microsoft.com/office/powerpoint/2010/main" spd="med" advClick="1"/>
-</p:sld>
-</file>
-
 <file path=ppt/slides/slide28.xml><?xml version="1.0" encoding="utf-8"?>
 <p:sld xmlns:a="http://schemas.openxmlformats.org/drawingml/2006/main" xmlns:r="http://schemas.openxmlformats.org/officeDocument/2006/relationships" xmlns:p="http://schemas.openxmlformats.org/presentationml/2006/main" xmlns:m="http://schemas.openxmlformats.org/officeDocument/2006/math" xmlns:a14="http://schemas.microsoft.com/office/drawing/2010/main" showMasterSp="1" showMasterPhAnim="1">
   <p:cSld>
@@ -16437,7 +16615,7 @@
       </p:grpSpPr>
       <p:sp>
         <p:nvSpPr>
-          <p:cNvPr id="362" name="References"/>
+          <p:cNvPr id="364" name="Other ways to calculate ΔG"/>
           <p:cNvSpPr txBox="1"/>
           <p:nvPr>
             <p:ph type="title"/>
@@ -16454,14 +16632,14 @@
           <a:p>
             <a:pPr/>
             <a:r>
-              <a:t>References</a:t>
+              <a:t>Other ways to calculate ΔG</a:t>
             </a:r>
           </a:p>
         </p:txBody>
       </p:sp>
       <p:sp>
         <p:nvSpPr>
-          <p:cNvPr id="363" name="[1] Nguyen, T. H.; Minh, D. D. L. Intermediate Thermodynamic States Contribute Equally to Free Energy Convergence: A Demonstration with Replica Exchange. Journal of Chemical Theory and Computation 2016, 12 (5), 2154–2161. https://doi.org/10.1021/acs.jctc"/>
+          <p:cNvPr id="365" name="Multistate Bennett Acceptance Ratio (MBAR) [5]…"/>
           <p:cNvSpPr txBox="1"/>
           <p:nvPr>
             <p:ph type="body" idx="1"/>
@@ -16476,6 +16654,153 @@
           <a:bodyPr/>
           <a:lstStyle/>
           <a:p>
+            <a:pPr/>
+            <a:r>
+              <a:t>Multistate Bennett Acceptance Ratio (MBAR) [5]</a:t>
+            </a:r>
+          </a:p>
+          <a:p>
+            <a:pPr lvl="1"/>
+            <a:r>
+              <a:t>estimates free energies and thermodynamic expectations from a series of states</a:t>
+            </a:r>
+          </a:p>
+          <a:p>
+            <a:pPr lvl="1"/>
+            <a:r>
+              <a:t>extension of Bennett Acceptance Ratio (BAR) [4], which uses data from two states</a:t>
+            </a:r>
+          </a:p>
+          <a:p>
+            <a:pPr lvl="1"/>
+            <a:r>
+              <a:t>Proven to be statistically optimal</a:t>
+            </a:r>
+          </a:p>
+          <a:p>
+            <a:pPr/>
+            <a:r>
+              <a:t>Thermodynamic integration is based on the fundamental theorem of calculus, integrating one the derivative of the free energy with respect to a parameter</a:t>
+            </a:r>
+          </a:p>
+          <a:p>
+            <a:pPr/>
+            <a:r>
+              <a:rPr u="sng"/>
+              <a:t>All</a:t>
+            </a:r>
+            <a:r>
+              <a:t> of the methods require thermodynamic states with configuration space overlap, meaning that</a:t>
+            </a:r>
+          </a:p>
+          <a:p>
+            <a:pPr lvl="1"/>
+            <a:r>
+              <a:t>similar configurations have similar energies</a:t>
+            </a:r>
+          </a:p>
+          <a:p>
+            <a:pPr lvl="1"/>
+            <a:r>
+              <a:t>the most relevant configuration space is similar</a:t>
+            </a:r>
+          </a:p>
+        </p:txBody>
+      </p:sp>
+      <p:sp>
+        <p:nvSpPr>
+          <p:cNvPr id="366" name="Slide Number"/>
+          <p:cNvSpPr txBox="1"/>
+          <p:nvPr>
+            <p:ph type="sldNum" sz="quarter" idx="2"/>
+          </p:nvPr>
+        </p:nvSpPr>
+        <p:spPr>
+          <a:prstGeom prst="rect">
+            <a:avLst/>
+          </a:prstGeom>
+          <a:extLst>
+            <a:ext uri="{C572A759-6A51-4108-AA02-DFA0A04FC94B}">
+              <ma14:wrappingTextBoxFlag xmlns:ma14="http://schemas.microsoft.com/office/mac/drawingml/2011/main" val="1"/>
+            </a:ext>
+          </a:extLst>
+        </p:spPr>
+        <p:txBody>
+          <a:bodyPr/>
+          <a:lstStyle/>
+          <a:p>
+            <a:pPr/>
+            <a:fld id="{86CB4B4D-7CA3-9044-876B-883B54F8677D}" type="slidenum"/>
+          </a:p>
+        </p:txBody>
+      </p:sp>
+    </p:spTree>
+  </p:cSld>
+  <p:clrMapOvr>
+    <a:masterClrMapping/>
+  </p:clrMapOvr>
+  <p:transition xmlns:p14="http://schemas.microsoft.com/office/powerpoint/2010/main" spd="med" advClick="1"/>
+</p:sld>
+</file>
+
+<file path=ppt/slides/slide29.xml><?xml version="1.0" encoding="utf-8"?>
+<p:sld xmlns:a="http://schemas.openxmlformats.org/drawingml/2006/main" xmlns:r="http://schemas.openxmlformats.org/officeDocument/2006/relationships" xmlns:p="http://schemas.openxmlformats.org/presentationml/2006/main" xmlns:m="http://schemas.openxmlformats.org/officeDocument/2006/math" xmlns:a14="http://schemas.microsoft.com/office/drawing/2010/main" showMasterSp="1" showMasterPhAnim="1">
+  <p:cSld>
+    <p:spTree>
+      <p:nvGrpSpPr>
+        <p:cNvPr id="1" name=""/>
+        <p:cNvGrpSpPr/>
+        <p:nvPr/>
+      </p:nvGrpSpPr>
+      <p:grpSpPr>
+        <a:xfrm>
+          <a:off x="0" y="0"/>
+          <a:ext cx="0" cy="0"/>
+          <a:chOff x="0" y="0"/>
+          <a:chExt cx="0" cy="0"/>
+        </a:xfrm>
+      </p:grpSpPr>
+      <p:sp>
+        <p:nvSpPr>
+          <p:cNvPr id="368" name="References"/>
+          <p:cNvSpPr txBox="1"/>
+          <p:nvPr>
+            <p:ph type="title"/>
+          </p:nvPr>
+        </p:nvSpPr>
+        <p:spPr>
+          <a:prstGeom prst="rect">
+            <a:avLst/>
+          </a:prstGeom>
+        </p:spPr>
+        <p:txBody>
+          <a:bodyPr/>
+          <a:lstStyle/>
+          <a:p>
+            <a:pPr/>
+            <a:r>
+              <a:t>References</a:t>
+            </a:r>
+          </a:p>
+        </p:txBody>
+      </p:sp>
+      <p:sp>
+        <p:nvSpPr>
+          <p:cNvPr id="369" name="[1] Nguyen, T. H.; Minh, D. D. L. Intermediate Thermodynamic States Contribute Equally to Free Energy Convergence: A Demonstration with Replica Exchange. Journal of Chemical Theory and Computation 2016, 12 (5), 2154–2161. https://doi.org/10.1021/acs.jctc"/>
+          <p:cNvSpPr txBox="1"/>
+          <p:nvPr>
+            <p:ph type="body" idx="1"/>
+          </p:nvPr>
+        </p:nvSpPr>
+        <p:spPr>
+          <a:prstGeom prst="rect">
+            <a:avLst/>
+          </a:prstGeom>
+        </p:spPr>
+        <p:txBody>
+          <a:bodyPr/>
+          <a:lstStyle/>
+          <a:p>
             <a:pPr marL="561798" indent="-561798" defTabSz="747593">
               <a:defRPr sz="4550"/>
             </a:pPr>
@@ -16537,7 +16862,7 @@
       </p:sp>
       <p:sp>
         <p:nvSpPr>
-          <p:cNvPr id="364" name="Slide Number"/>
+          <p:cNvPr id="370" name="Slide Number"/>
           <p:cNvSpPr txBox="1"/>
           <p:nvPr>
             <p:ph type="sldNum" sz="quarter" idx="2"/>

</xml_diff>